<commit_message>
update DG seq diagram
</commit_message>
<xml_diff>
--- a/docs/diagrams/EstimateRouteSequenceDiagram.pptx
+++ b/docs/diagrams/EstimateRouteSequenceDiagram.pptx
@@ -3534,7 +3534,7 @@
         </p:nvSpPr>
         <p:spPr>
           <a:xfrm>
-            <a:off x="-336089" y="1905000"/>
+            <a:off x="-336089" y="1878703"/>
             <a:ext cx="11232689" cy="4610099"/>
           </a:xfrm>
           <a:prstGeom prst="roundRect">
@@ -3595,7 +3595,7 @@
         </p:nvSpPr>
         <p:spPr>
           <a:xfrm>
-            <a:off x="354992" y="2311002"/>
+            <a:off x="328780" y="2064434"/>
             <a:ext cx="1455629" cy="346760"/>
           </a:xfrm>
           <a:prstGeom prst="rect">
@@ -3657,13 +3657,15 @@
       <p:cxnSp>
         <p:nvCxnSpPr>
           <p:cNvPr id="5" name="Straight Connector 4"/>
-          <p:cNvCxnSpPr/>
+          <p:cNvCxnSpPr>
+            <a:cxnSpLocks/>
+          </p:cNvCxnSpPr>
           <p:nvPr/>
         </p:nvCxnSpPr>
         <p:spPr>
           <a:xfrm>
-            <a:off x="990600" y="2688466"/>
-            <a:ext cx="0" cy="2597583"/>
+            <a:off x="990600" y="2480266"/>
+            <a:ext cx="0" cy="2805783"/>
           </a:xfrm>
           <a:prstGeom prst="line">
             <a:avLst/>
@@ -3699,8 +3701,8 @@
         </p:nvSpPr>
         <p:spPr>
           <a:xfrm>
-            <a:off x="875244" y="3010911"/>
-            <a:ext cx="156190" cy="3373158"/>
+            <a:off x="875243" y="2646992"/>
+            <a:ext cx="171473" cy="3737077"/>
           </a:xfrm>
           <a:prstGeom prst="rect">
             <a:avLst/>
@@ -3855,8 +3857,8 @@
         </p:nvSpPr>
         <p:spPr>
           <a:xfrm>
-            <a:off x="2999167" y="3122097"/>
-            <a:ext cx="174929" cy="1331747"/>
+            <a:off x="2999167" y="2869167"/>
+            <a:ext cx="186830" cy="1584678"/>
           </a:xfrm>
           <a:prstGeom prst="rect">
             <a:avLst/>
@@ -3906,7 +3908,7 @@
         </p:nvSpPr>
         <p:spPr>
           <a:xfrm>
-            <a:off x="6268943" y="3059199"/>
+            <a:off x="6230013" y="2538114"/>
             <a:ext cx="1149688" cy="731515"/>
           </a:xfrm>
           <a:prstGeom prst="rect">
@@ -3983,8 +3985,8 @@
         </p:nvCxnSpPr>
         <p:spPr>
           <a:xfrm>
-            <a:off x="6760026" y="3745481"/>
-            <a:ext cx="10897" cy="2638588"/>
+            <a:off x="6762978" y="3282452"/>
+            <a:ext cx="7945" cy="3101617"/>
           </a:xfrm>
           <a:prstGeom prst="line">
             <a:avLst/>
@@ -4020,8 +4022,8 @@
         </p:nvSpPr>
         <p:spPr>
           <a:xfrm>
-            <a:off x="6680161" y="3745481"/>
-            <a:ext cx="159730" cy="610741"/>
+            <a:off x="6684882" y="3282452"/>
+            <a:ext cx="156191" cy="1073772"/>
           </a:xfrm>
           <a:prstGeom prst="rect">
             <a:avLst/>
@@ -4069,7 +4071,7 @@
         </p:nvCxnSpPr>
         <p:spPr>
           <a:xfrm>
-            <a:off x="-1167049" y="3010911"/>
+            <a:off x="-1167049" y="2646992"/>
             <a:ext cx="2042293" cy="0"/>
           </a:xfrm>
           <a:prstGeom prst="straightConnector1">
@@ -4107,7 +4109,7 @@
         </p:nvCxnSpPr>
         <p:spPr>
           <a:xfrm flipV="1">
-            <a:off x="1066800" y="3142349"/>
+            <a:off x="1080031" y="2889519"/>
             <a:ext cx="1919222" cy="1"/>
           </a:xfrm>
           <a:prstGeom prst="straightConnector1">
@@ -4143,7 +4145,7 @@
         </p:nvSpPr>
         <p:spPr>
           <a:xfrm>
-            <a:off x="-1167049" y="2754394"/>
+            <a:off x="-1213789" y="2438278"/>
             <a:ext cx="2010593" cy="215444"/>
           </a:xfrm>
           <a:prstGeom prst="rect">
@@ -4195,7 +4197,7 @@
         </p:nvCxnSpPr>
         <p:spPr>
           <a:xfrm flipV="1">
-            <a:off x="4970985" y="3789434"/>
+            <a:off x="4946928" y="3282525"/>
             <a:ext cx="1304981" cy="1"/>
           </a:xfrm>
           <a:prstGeom prst="straightConnector1">
@@ -4231,7 +4233,7 @@
         </p:nvSpPr>
         <p:spPr>
           <a:xfrm>
-            <a:off x="3569417" y="4614484"/>
+            <a:off x="3654857" y="4500963"/>
             <a:ext cx="855809" cy="215444"/>
           </a:xfrm>
           <a:prstGeom prst="rect">
@@ -4315,7 +4317,7 @@
         <p:spPr>
           <a:xfrm>
             <a:off x="1028701" y="4438755"/>
-            <a:ext cx="2057931" cy="15089"/>
+            <a:ext cx="2063881" cy="15090"/>
           </a:xfrm>
           <a:prstGeom prst="straightConnector1">
             <a:avLst/>
@@ -4392,7 +4394,7 @@
         </p:nvCxnSpPr>
         <p:spPr>
           <a:xfrm flipV="1">
-            <a:off x="1043814" y="4640980"/>
+            <a:off x="1060994" y="4513785"/>
             <a:ext cx="5652560" cy="7220"/>
           </a:xfrm>
           <a:prstGeom prst="straightConnector1">
@@ -4428,8 +4430,8 @@
         </p:nvSpPr>
         <p:spPr>
           <a:xfrm>
-            <a:off x="6705600" y="4466999"/>
-            <a:ext cx="143174" cy="1660553"/>
+            <a:off x="6705600" y="4531470"/>
+            <a:ext cx="135473" cy="1724546"/>
           </a:xfrm>
           <a:prstGeom prst="rect">
             <a:avLst/>
@@ -4477,8 +4479,8 @@
         </p:nvCxnSpPr>
         <p:spPr>
           <a:xfrm flipV="1">
-            <a:off x="6855181" y="4552310"/>
-            <a:ext cx="4439384" cy="22107"/>
+            <a:off x="6858000" y="4572000"/>
+            <a:ext cx="4437778" cy="16180"/>
           </a:xfrm>
           <a:prstGeom prst="straightConnector1">
             <a:avLst/>
@@ -4515,7 +4517,7 @@
         </p:nvCxnSpPr>
         <p:spPr>
           <a:xfrm flipV="1">
-            <a:off x="6846147" y="4713374"/>
+            <a:off x="6846116" y="4698965"/>
             <a:ext cx="4448418" cy="11026"/>
           </a:xfrm>
           <a:prstGeom prst="straightConnector1">
@@ -4555,7 +4557,7 @@
         </p:nvCxnSpPr>
         <p:spPr>
           <a:xfrm>
-            <a:off x="1031434" y="6127552"/>
+            <a:off x="1031434" y="6256016"/>
             <a:ext cx="5674166" cy="0"/>
           </a:xfrm>
           <a:prstGeom prst="straightConnector1">
@@ -4593,7 +4595,7 @@
         </p:nvSpPr>
         <p:spPr>
           <a:xfrm>
-            <a:off x="3193281" y="3687016"/>
+            <a:off x="3191440" y="3272259"/>
             <a:ext cx="1455519" cy="184666"/>
           </a:xfrm>
           <a:prstGeom prst="rect">
@@ -4721,7 +4723,7 @@
         </p:nvSpPr>
         <p:spPr>
           <a:xfrm>
-            <a:off x="7020246" y="5361138"/>
+            <a:off x="7030893" y="5546089"/>
             <a:ext cx="1590354" cy="461538"/>
           </a:xfrm>
           <a:prstGeom prst="rect">
@@ -4788,8 +4790,8 @@
         </p:nvSpPr>
         <p:spPr>
           <a:xfrm>
-            <a:off x="7733800" y="5848424"/>
-            <a:ext cx="152400" cy="171376"/>
+            <a:off x="7732382" y="6007626"/>
+            <a:ext cx="170015" cy="114317"/>
           </a:xfrm>
           <a:prstGeom prst="rect">
             <a:avLst/>
@@ -4835,7 +4837,7 @@
         </p:nvCxnSpPr>
         <p:spPr>
           <a:xfrm>
-            <a:off x="6832064" y="6019800"/>
+            <a:off x="6819669" y="6131821"/>
             <a:ext cx="966624" cy="0"/>
           </a:xfrm>
           <a:prstGeom prst="straightConnector1">
@@ -4914,8 +4916,8 @@
         </p:nvSpPr>
         <p:spPr>
           <a:xfrm>
-            <a:off x="3810000" y="2579556"/>
-            <a:ext cx="2421511" cy="727256"/>
+            <a:off x="3826890" y="2279834"/>
+            <a:ext cx="2336662" cy="727256"/>
           </a:xfrm>
           <a:prstGeom prst="rect">
             <a:avLst/>
@@ -4997,7 +4999,7 @@
         </p:nvCxnSpPr>
         <p:spPr>
           <a:xfrm>
-            <a:off x="3174096" y="3654032"/>
+            <a:off x="3162776" y="3237641"/>
             <a:ext cx="1597356" cy="1"/>
           </a:xfrm>
           <a:prstGeom prst="straightConnector1">
@@ -5031,8 +5033,8 @@
         </p:nvSpPr>
         <p:spPr>
           <a:xfrm>
-            <a:off x="4748885" y="3325350"/>
-            <a:ext cx="205843" cy="123165"/>
+            <a:off x="4748885" y="3013668"/>
+            <a:ext cx="212468" cy="118413"/>
           </a:xfrm>
           <a:prstGeom prst="rect">
             <a:avLst/>
@@ -5079,9 +5081,9 @@
           <p:nvPr/>
         </p:nvCxnSpPr>
         <p:spPr>
-          <a:xfrm flipH="1">
-            <a:off x="4860411" y="3335767"/>
-            <a:ext cx="1047" cy="1186688"/>
+          <a:xfrm>
+            <a:off x="4860412" y="2907163"/>
+            <a:ext cx="0" cy="1512437"/>
           </a:xfrm>
           <a:prstGeom prst="line">
             <a:avLst/>
@@ -5117,8 +5119,8 @@
         </p:nvSpPr>
         <p:spPr>
           <a:xfrm>
-            <a:off x="4758537" y="3673450"/>
-            <a:ext cx="201572" cy="682771"/>
+            <a:off x="4758536" y="3226266"/>
+            <a:ext cx="216697" cy="1129956"/>
           </a:xfrm>
           <a:prstGeom prst="rect">
             <a:avLst/>
@@ -5202,7 +5204,7 @@
         </p:nvCxnSpPr>
         <p:spPr>
           <a:xfrm>
-            <a:off x="6858000" y="5361138"/>
+            <a:off x="6868647" y="5577203"/>
             <a:ext cx="162246" cy="0"/>
           </a:xfrm>
           <a:prstGeom prst="straightConnector1">
@@ -5238,8 +5240,8 @@
         </p:nvCxnSpPr>
         <p:spPr>
           <a:xfrm>
-            <a:off x="3187241" y="3276600"/>
-            <a:ext cx="627607" cy="0"/>
+            <a:off x="3174096" y="2983386"/>
+            <a:ext cx="652793" cy="0"/>
           </a:xfrm>
           <a:prstGeom prst="straightConnector1">
             <a:avLst/>
@@ -5274,7 +5276,7 @@
         </p:nvCxnSpPr>
         <p:spPr>
           <a:xfrm>
-            <a:off x="3174096" y="3429000"/>
+            <a:off x="3207223" y="3132081"/>
             <a:ext cx="1600428" cy="0"/>
           </a:xfrm>
           <a:prstGeom prst="straightConnector1">
@@ -5312,7 +5314,7 @@
         </p:nvSpPr>
         <p:spPr>
           <a:xfrm>
-            <a:off x="4724400" y="4386590"/>
+            <a:off x="4724400" y="4343400"/>
             <a:ext cx="258404" cy="261610"/>
           </a:xfrm>
           <a:prstGeom prst="rect">
@@ -5351,7 +5353,7 @@
         </p:nvSpPr>
         <p:spPr>
           <a:xfrm>
-            <a:off x="994307" y="2896251"/>
+            <a:off x="780596" y="2653722"/>
             <a:ext cx="2010593" cy="215444"/>
           </a:xfrm>
           <a:prstGeom prst="rect">
@@ -5451,7 +5453,7 @@
         </p:nvSpPr>
         <p:spPr>
           <a:xfrm>
-            <a:off x="10701071" y="1200705"/>
+            <a:off x="10735808" y="1187122"/>
             <a:ext cx="1344369" cy="437327"/>
           </a:xfrm>
           <a:prstGeom prst="rect">
@@ -5487,12 +5489,12 @@
           <a:p>
             <a:pPr algn="ctr"/>
             <a:r>
-              <a:rPr lang="en-US" sz="1600" dirty="0" err="1">
+              <a:rPr lang="en-US" sz="1600" dirty="0">
                 <a:solidFill>
                   <a:schemeClr val="bg1"/>
                 </a:solidFill>
               </a:rPr>
-              <a:t>er:MapPanel</a:t>
+              <a:t>:Map</a:t>
             </a:r>
             <a:endParaRPr lang="en-SG" sz="1600" dirty="0">
               <a:solidFill>
@@ -5516,8 +5518,8 @@
         </p:nvSpPr>
         <p:spPr>
           <a:xfrm>
-            <a:off x="11300831" y="4087623"/>
-            <a:ext cx="172791" cy="103377"/>
+            <a:off x="11300831" y="4063457"/>
+            <a:ext cx="200066" cy="127544"/>
           </a:xfrm>
           <a:prstGeom prst="rect">
             <a:avLst/>
@@ -5614,8 +5616,8 @@
         </p:nvSpPr>
         <p:spPr>
           <a:xfrm>
-            <a:off x="9591750" y="3848012"/>
-            <a:ext cx="855809" cy="215444"/>
+            <a:off x="9577784" y="3905934"/>
+            <a:ext cx="998300" cy="215444"/>
           </a:xfrm>
           <a:prstGeom prst="rect">
             <a:avLst/>
@@ -5641,7 +5643,7 @@
           <a:p>
             <a:r>
               <a:rPr lang="en-US" dirty="0" err="1"/>
-              <a:t>getMap</a:t>
+              <a:t>clearRoute</a:t>
             </a:r>
             <a:r>
               <a:rPr lang="en-US" dirty="0"/>
@@ -5697,7 +5699,7 @@
                   </a:schemeClr>
                 </a:solidFill>
               </a:rPr>
-              <a:t>addRouteToMap</a:t>
+              <a:t>getDirectionRequest</a:t>
             </a:r>
             <a:r>
               <a:rPr lang="en-US" dirty="0">
@@ -5707,7 +5709,7 @@
                   </a:schemeClr>
                 </a:solidFill>
               </a:rPr>
-              <a:t>())</a:t>
+              <a:t>()</a:t>
             </a:r>
           </a:p>
         </p:txBody>
@@ -5728,7 +5730,7 @@
         </p:nvCxnSpPr>
         <p:spPr>
           <a:xfrm flipV="1">
-            <a:off x="6839208" y="3802233"/>
+            <a:off x="6851983" y="3644037"/>
             <a:ext cx="1553353" cy="7767"/>
           </a:xfrm>
           <a:prstGeom prst="straightConnector1">
@@ -5880,7 +5882,7 @@
         </p:nvSpPr>
         <p:spPr>
           <a:xfrm>
-            <a:off x="8409197" y="3795482"/>
+            <a:off x="8409485" y="3619369"/>
             <a:ext cx="160218" cy="152400"/>
           </a:xfrm>
           <a:prstGeom prst="rect">
@@ -5935,8 +5937,8 @@
         </p:nvCxnSpPr>
         <p:spPr>
           <a:xfrm>
-            <a:off x="6858000" y="3962400"/>
-            <a:ext cx="1534561" cy="0"/>
+            <a:off x="6845222" y="3771769"/>
+            <a:ext cx="1660546" cy="0"/>
           </a:xfrm>
           <a:prstGeom prst="straightConnector1">
             <a:avLst/>
@@ -5979,8 +5981,8 @@
         </p:nvSpPr>
         <p:spPr>
           <a:xfrm>
-            <a:off x="7487713" y="3538763"/>
-            <a:ext cx="855809" cy="215444"/>
+            <a:off x="6883889" y="3154881"/>
+            <a:ext cx="1415095" cy="215444"/>
           </a:xfrm>
           <a:prstGeom prst="rect">
             <a:avLst/>
@@ -6005,12 +6007,8 @@
           </a:lstStyle>
           <a:p>
             <a:r>
-              <a:rPr lang="en-US" dirty="0" err="1"/>
-              <a:t>getLatLng</a:t>
-            </a:r>
-            <a:r>
               <a:rPr lang="en-US" dirty="0"/>
-              <a:t>()</a:t>
+              <a:t>Method 1</a:t>
             </a:r>
           </a:p>
         </p:txBody>
@@ -6239,8 +6237,8 @@
         </p:nvSpPr>
         <p:spPr>
           <a:xfrm>
-            <a:off x="9574640" y="4905576"/>
-            <a:ext cx="160218" cy="152400"/>
+            <a:off x="9574639" y="4905576"/>
+            <a:ext cx="172482" cy="96089"/>
           </a:xfrm>
           <a:prstGeom prst="rect">
             <a:avLst/>
@@ -6338,7 +6336,7 @@
         </p:nvCxnSpPr>
         <p:spPr>
           <a:xfrm flipV="1">
-            <a:off x="6832064" y="5057976"/>
+            <a:off x="6861447" y="5000729"/>
             <a:ext cx="2740942" cy="6799"/>
           </a:xfrm>
           <a:prstGeom prst="straightConnector1">
@@ -6382,7 +6380,7 @@
         </p:nvSpPr>
         <p:spPr>
           <a:xfrm>
-            <a:off x="7208816" y="4696519"/>
+            <a:off x="6535889" y="4709830"/>
             <a:ext cx="1862689" cy="215444"/>
           </a:xfrm>
           <a:prstGeom prst="rect">
@@ -6408,12 +6406,8 @@
           </a:lstStyle>
           <a:p>
             <a:r>
-              <a:rPr lang="en-US" dirty="0" err="1"/>
-              <a:t>calculateDistanceMatrix</a:t>
-            </a:r>
-            <a:r>
               <a:rPr lang="en-US" dirty="0"/>
-              <a:t>()</a:t>
+              <a:t>Method 2</a:t>
             </a:r>
           </a:p>
         </p:txBody>
@@ -6432,8 +6426,8 @@
         </p:nvSpPr>
         <p:spPr>
           <a:xfrm>
-            <a:off x="2210988" y="1178652"/>
-            <a:ext cx="4635159" cy="430887"/>
+            <a:off x="2213959" y="878537"/>
+            <a:ext cx="5073852" cy="861774"/>
           </a:xfrm>
           <a:prstGeom prst="rect">
             <a:avLst/>
@@ -6607,6 +6601,74 @@
                 </a:solidFill>
               </a:rPr>
               <a:t>/nus”</a:t>
+            </a:r>
+          </a:p>
+          <a:p>
+            <a:r>
+              <a:rPr lang="en-US" sz="1400" dirty="0">
+                <a:solidFill>
+                  <a:srgbClr val="0070C0"/>
+                </a:solidFill>
+              </a:rPr>
+              <a:t>Method 1 = “</a:t>
+            </a:r>
+            <a:r>
+              <a:rPr lang="en-US" sz="1400" dirty="0" err="1">
+                <a:solidFill>
+                  <a:srgbClr val="0070C0"/>
+                </a:solidFill>
+              </a:rPr>
+              <a:t>initialiseLatLngFromAddress</a:t>
+            </a:r>
+            <a:r>
+              <a:rPr lang="en-US" sz="1400" dirty="0">
+                <a:solidFill>
+                  <a:srgbClr val="0070C0"/>
+                </a:solidFill>
+              </a:rPr>
+              <a:t>(String)”</a:t>
+            </a:r>
+          </a:p>
+          <a:p>
+            <a:r>
+              <a:rPr lang="en-US" sz="1400" dirty="0">
+                <a:solidFill>
+                  <a:srgbClr val="0070C0"/>
+                </a:solidFill>
+              </a:rPr>
+              <a:t>Method 2 = “</a:t>
+            </a:r>
+            <a:r>
+              <a:rPr lang="en-US" sz="1400" dirty="0" err="1">
+                <a:solidFill>
+                  <a:srgbClr val="0070C0"/>
+                </a:solidFill>
+              </a:rPr>
+              <a:t>calculateDistanceMatrix</a:t>
+            </a:r>
+            <a:r>
+              <a:rPr lang="en-US" sz="1400" dirty="0">
+                <a:solidFill>
+                  <a:srgbClr val="0070C0"/>
+                </a:solidFill>
+              </a:rPr>
+              <a:t>(</a:t>
+            </a:r>
+            <a:r>
+              <a:rPr lang="en-US" sz="1400" dirty="0" err="1">
+                <a:solidFill>
+                  <a:srgbClr val="0070C0"/>
+                </a:solidFill>
+              </a:rPr>
+              <a:t>LatLng,LatLng,TravelMode</a:t>
+            </a:r>
+            <a:r>
+              <a:rPr lang="en-US" sz="1400" dirty="0">
+                <a:solidFill>
+                  <a:srgbClr val="0070C0"/>
+                </a:solidFill>
+              </a:rPr>
+              <a:t>)”</a:t>
             </a:r>
           </a:p>
         </p:txBody>
@@ -6659,10 +6721,153 @@
       </p:cxnSp>
       <p:sp>
         <p:nvSpPr>
-          <p:cNvPr id="102" name="TextBox 101">
+          <p:cNvPr id="100" name="Rectangle 99">
             <a:extLst>
               <a:ext uri="{FF2B5EF4-FFF2-40B4-BE49-F238E27FC236}">
-                <a16:creationId xmlns:a16="http://schemas.microsoft.com/office/drawing/2014/main" id="{EE28F663-A2EF-1D4A-AC4D-A905481833BC}"/>
+                <a16:creationId xmlns:a16="http://schemas.microsoft.com/office/drawing/2014/main" id="{8FA461A7-E6B4-6D43-9DFE-0EFD8DF0451E}"/>
+              </a:ext>
+            </a:extLst>
+          </p:cNvPr>
+          <p:cNvSpPr/>
+          <p:nvPr/>
+        </p:nvSpPr>
+        <p:spPr>
+          <a:xfrm>
+            <a:off x="11306134" y="3810000"/>
+            <a:ext cx="194763" cy="95934"/>
+          </a:xfrm>
+          <a:prstGeom prst="rect">
+            <a:avLst/>
+          </a:prstGeom>
+          <a:solidFill>
+            <a:srgbClr val="0070C0"/>
+          </a:solidFill>
+          <a:ln>
+            <a:solidFill>
+              <a:srgbClr val="0070C0"/>
+            </a:solidFill>
+          </a:ln>
+          <a:effectLst/>
+        </p:spPr>
+        <p:style>
+          <a:lnRef idx="1">
+            <a:schemeClr val="accent3"/>
+          </a:lnRef>
+          <a:fillRef idx="2">
+            <a:schemeClr val="accent3"/>
+          </a:fillRef>
+          <a:effectRef idx="1">
+            <a:schemeClr val="accent3"/>
+          </a:effectRef>
+          <a:fontRef idx="minor">
+            <a:schemeClr val="dk1"/>
+          </a:fontRef>
+        </p:style>
+        <p:txBody>
+          <a:bodyPr rtlCol="0" anchor="ctr"/>
+          <a:lstStyle/>
+          <a:p>
+            <a:pPr algn="ctr"/>
+            <a:endParaRPr lang="en-SG" sz="1400"/>
+          </a:p>
+        </p:txBody>
+      </p:sp>
+      <p:cxnSp>
+        <p:nvCxnSpPr>
+          <p:cNvPr id="103" name="Straight Arrow Connector 102">
+            <a:extLst>
+              <a:ext uri="{FF2B5EF4-FFF2-40B4-BE49-F238E27FC236}">
+                <a16:creationId xmlns:a16="http://schemas.microsoft.com/office/drawing/2014/main" id="{1570D28B-7AB5-DE42-BC78-834F83C16DFC}"/>
+              </a:ext>
+            </a:extLst>
+          </p:cNvPr>
+          <p:cNvCxnSpPr>
+            <a:cxnSpLocks/>
+          </p:cNvCxnSpPr>
+          <p:nvPr/>
+        </p:nvCxnSpPr>
+        <p:spPr>
+          <a:xfrm>
+            <a:off x="6855181" y="3919722"/>
+            <a:ext cx="4462501" cy="0"/>
+          </a:xfrm>
+          <a:prstGeom prst="straightConnector1">
+            <a:avLst/>
+          </a:prstGeom>
+          <a:ln w="19050">
+            <a:solidFill>
+              <a:srgbClr val="0070C0"/>
+            </a:solidFill>
+            <a:prstDash val="sysDash"/>
+            <a:headEnd type="arrow" w="med" len="med"/>
+            <a:tailEnd type="none" w="med" len="med"/>
+          </a:ln>
+        </p:spPr>
+        <p:style>
+          <a:lnRef idx="1">
+            <a:schemeClr val="accent1"/>
+          </a:lnRef>
+          <a:fillRef idx="0">
+            <a:schemeClr val="accent1"/>
+          </a:fillRef>
+          <a:effectRef idx="0">
+            <a:schemeClr val="accent1"/>
+          </a:effectRef>
+          <a:fontRef idx="minor">
+            <a:schemeClr val="tx1"/>
+          </a:fontRef>
+        </p:style>
+      </p:cxnSp>
+      <p:cxnSp>
+        <p:nvCxnSpPr>
+          <p:cNvPr id="104" name="Straight Arrow Connector 103">
+            <a:extLst>
+              <a:ext uri="{FF2B5EF4-FFF2-40B4-BE49-F238E27FC236}">
+                <a16:creationId xmlns:a16="http://schemas.microsoft.com/office/drawing/2014/main" id="{DA0BDE4B-EA5C-9846-A051-3472D42B8C3C}"/>
+              </a:ext>
+            </a:extLst>
+          </p:cNvPr>
+          <p:cNvCxnSpPr>
+            <a:cxnSpLocks/>
+          </p:cNvCxnSpPr>
+          <p:nvPr/>
+        </p:nvCxnSpPr>
+        <p:spPr>
+          <a:xfrm flipV="1">
+            <a:off x="6878298" y="3796049"/>
+            <a:ext cx="4439384" cy="26064"/>
+          </a:xfrm>
+          <a:prstGeom prst="straightConnector1">
+            <a:avLst/>
+          </a:prstGeom>
+          <a:ln w="19050">
+            <a:solidFill>
+              <a:srgbClr val="0070C0"/>
+            </a:solidFill>
+            <a:tailEnd type="arrow"/>
+          </a:ln>
+        </p:spPr>
+        <p:style>
+          <a:lnRef idx="1">
+            <a:schemeClr val="accent1"/>
+          </a:lnRef>
+          <a:fillRef idx="0">
+            <a:schemeClr val="accent1"/>
+          </a:fillRef>
+          <a:effectRef idx="0">
+            <a:schemeClr val="accent1"/>
+          </a:effectRef>
+          <a:fontRef idx="minor">
+            <a:schemeClr val="tx1"/>
+          </a:fontRef>
+        </p:style>
+      </p:cxnSp>
+      <p:sp>
+        <p:nvSpPr>
+          <p:cNvPr id="105" name="TextBox 104">
+            <a:extLst>
+              <a:ext uri="{FF2B5EF4-FFF2-40B4-BE49-F238E27FC236}">
+                <a16:creationId xmlns:a16="http://schemas.microsoft.com/office/drawing/2014/main" id="{C13C7A8C-F968-D744-A60E-DF88F44A76C8}"/>
               </a:ext>
             </a:extLst>
           </p:cNvPr>
@@ -6671,8 +6876,8 @@
         </p:nvSpPr>
         <p:spPr>
           <a:xfrm>
-            <a:off x="8537189" y="4168546"/>
-            <a:ext cx="855809" cy="215444"/>
+            <a:off x="9063314" y="3555908"/>
+            <a:ext cx="1827490" cy="215444"/>
           </a:xfrm>
           <a:prstGeom prst="rect">
             <a:avLst/>
@@ -6698,9 +6903,591 @@
           <a:p>
             <a:r>
               <a:rPr lang="en-US" dirty="0" err="1"/>
-              <a:t>actualMap</a:t>
-            </a:r>
-            <a:endParaRPr lang="en-US" dirty="0"/>
+              <a:t>removeExistingMarker</a:t>
+            </a:r>
+            <a:r>
+              <a:rPr lang="en-US" dirty="0"/>
+              <a:t>()</a:t>
+            </a:r>
+          </a:p>
+        </p:txBody>
+      </p:sp>
+      <p:sp>
+        <p:nvSpPr>
+          <p:cNvPr id="106" name="Rectangle 105">
+            <a:extLst>
+              <a:ext uri="{FF2B5EF4-FFF2-40B4-BE49-F238E27FC236}">
+                <a16:creationId xmlns:a16="http://schemas.microsoft.com/office/drawing/2014/main" id="{1D117D33-1C9A-1848-A0B1-F939B2219A39}"/>
+              </a:ext>
+            </a:extLst>
+          </p:cNvPr>
+          <p:cNvSpPr/>
+          <p:nvPr/>
+        </p:nvSpPr>
+        <p:spPr>
+          <a:xfrm>
+            <a:off x="8389213" y="3341550"/>
+            <a:ext cx="180490" cy="112596"/>
+          </a:xfrm>
+          <a:prstGeom prst="rect">
+            <a:avLst/>
+          </a:prstGeom>
+          <a:solidFill>
+            <a:srgbClr val="0070C0"/>
+          </a:solidFill>
+          <a:ln>
+            <a:solidFill>
+              <a:srgbClr val="0070C0"/>
+            </a:solidFill>
+          </a:ln>
+          <a:effectLst/>
+        </p:spPr>
+        <p:style>
+          <a:lnRef idx="1">
+            <a:schemeClr val="accent3"/>
+          </a:lnRef>
+          <a:fillRef idx="2">
+            <a:schemeClr val="accent3"/>
+          </a:fillRef>
+          <a:effectRef idx="1">
+            <a:schemeClr val="accent3"/>
+          </a:effectRef>
+          <a:fontRef idx="minor">
+            <a:schemeClr val="dk1"/>
+          </a:fontRef>
+        </p:style>
+        <p:txBody>
+          <a:bodyPr rtlCol="0" anchor="ctr"/>
+          <a:lstStyle/>
+          <a:p>
+            <a:pPr algn="ctr"/>
+            <a:endParaRPr lang="en-SG" sz="1400"/>
+          </a:p>
+        </p:txBody>
+      </p:sp>
+      <p:cxnSp>
+        <p:nvCxnSpPr>
+          <p:cNvPr id="107" name="Straight Arrow Connector 106">
+            <a:extLst>
+              <a:ext uri="{FF2B5EF4-FFF2-40B4-BE49-F238E27FC236}">
+                <a16:creationId xmlns:a16="http://schemas.microsoft.com/office/drawing/2014/main" id="{01AE59A3-C3D9-B54C-BA3B-4D5C53E3507B}"/>
+              </a:ext>
+            </a:extLst>
+          </p:cNvPr>
+          <p:cNvCxnSpPr>
+            <a:cxnSpLocks/>
+          </p:cNvCxnSpPr>
+          <p:nvPr/>
+        </p:nvCxnSpPr>
+        <p:spPr>
+          <a:xfrm flipV="1">
+            <a:off x="6845222" y="3352539"/>
+            <a:ext cx="1553353" cy="7767"/>
+          </a:xfrm>
+          <a:prstGeom prst="straightConnector1">
+            <a:avLst/>
+          </a:prstGeom>
+          <a:ln w="19050">
+            <a:solidFill>
+              <a:srgbClr val="0070C0"/>
+            </a:solidFill>
+            <a:tailEnd type="arrow"/>
+          </a:ln>
+        </p:spPr>
+        <p:style>
+          <a:lnRef idx="1">
+            <a:schemeClr val="accent1"/>
+          </a:lnRef>
+          <a:fillRef idx="0">
+            <a:schemeClr val="accent1"/>
+          </a:fillRef>
+          <a:effectRef idx="0">
+            <a:schemeClr val="accent1"/>
+          </a:effectRef>
+          <a:fontRef idx="minor">
+            <a:schemeClr val="tx1"/>
+          </a:fontRef>
+        </p:style>
+      </p:cxnSp>
+      <p:cxnSp>
+        <p:nvCxnSpPr>
+          <p:cNvPr id="108" name="Straight Arrow Connector 107">
+            <a:extLst>
+              <a:ext uri="{FF2B5EF4-FFF2-40B4-BE49-F238E27FC236}">
+                <a16:creationId xmlns:a16="http://schemas.microsoft.com/office/drawing/2014/main" id="{090F67FA-D783-FE4E-A278-1434FEEA6505}"/>
+              </a:ext>
+            </a:extLst>
+          </p:cNvPr>
+          <p:cNvCxnSpPr>
+            <a:cxnSpLocks/>
+          </p:cNvCxnSpPr>
+          <p:nvPr/>
+        </p:nvCxnSpPr>
+        <p:spPr>
+          <a:xfrm>
+            <a:off x="6813758" y="3454146"/>
+            <a:ext cx="1660546" cy="0"/>
+          </a:xfrm>
+          <a:prstGeom prst="straightConnector1">
+            <a:avLst/>
+          </a:prstGeom>
+          <a:ln w="19050">
+            <a:solidFill>
+              <a:srgbClr val="0070C0"/>
+            </a:solidFill>
+            <a:prstDash val="sysDash"/>
+            <a:headEnd type="arrow" w="med" len="med"/>
+            <a:tailEnd type="none" w="med" len="med"/>
+          </a:ln>
+        </p:spPr>
+        <p:style>
+          <a:lnRef idx="1">
+            <a:schemeClr val="accent1"/>
+          </a:lnRef>
+          <a:fillRef idx="0">
+            <a:schemeClr val="accent1"/>
+          </a:fillRef>
+          <a:effectRef idx="0">
+            <a:schemeClr val="accent1"/>
+          </a:effectRef>
+          <a:fontRef idx="minor">
+            <a:schemeClr val="tx1"/>
+          </a:fontRef>
+        </p:style>
+      </p:cxnSp>
+      <p:sp>
+        <p:nvSpPr>
+          <p:cNvPr id="110" name="TextBox 109">
+            <a:extLst>
+              <a:ext uri="{FF2B5EF4-FFF2-40B4-BE49-F238E27FC236}">
+                <a16:creationId xmlns:a16="http://schemas.microsoft.com/office/drawing/2014/main" id="{7BE5275E-95B1-F348-A78E-05B5B386DFDA}"/>
+              </a:ext>
+            </a:extLst>
+          </p:cNvPr>
+          <p:cNvSpPr txBox="1"/>
+          <p:nvPr/>
+        </p:nvSpPr>
+        <p:spPr>
+          <a:xfrm>
+            <a:off x="7188003" y="3436361"/>
+            <a:ext cx="855809" cy="215444"/>
+          </a:xfrm>
+          <a:prstGeom prst="rect">
+            <a:avLst/>
+          </a:prstGeom>
+          <a:noFill/>
+        </p:spPr>
+        <p:txBody>
+          <a:bodyPr wrap="square" lIns="0" tIns="0" rIns="0" bIns="0" rtlCol="0">
+            <a:spAutoFit/>
+          </a:bodyPr>
+          <a:lstStyle>
+            <a:defPPr>
+              <a:defRPr lang="en-US"/>
+            </a:defPPr>
+            <a:lvl1pPr algn="r">
+              <a:defRPr sz="1400">
+                <a:solidFill>
+                  <a:srgbClr val="0070C0"/>
+                </a:solidFill>
+              </a:defRPr>
+            </a:lvl1pPr>
+          </a:lstStyle>
+          <a:p>
+            <a:r>
+              <a:rPr lang="en-US" dirty="0" err="1"/>
+              <a:t>getLatLng</a:t>
+            </a:r>
+            <a:r>
+              <a:rPr lang="en-US" dirty="0"/>
+              <a:t>()</a:t>
+            </a:r>
+          </a:p>
+        </p:txBody>
+      </p:sp>
+      <p:sp>
+        <p:nvSpPr>
+          <p:cNvPr id="112" name="Rectangle 111">
+            <a:extLst>
+              <a:ext uri="{FF2B5EF4-FFF2-40B4-BE49-F238E27FC236}">
+                <a16:creationId xmlns:a16="http://schemas.microsoft.com/office/drawing/2014/main" id="{DFEDC8E6-5EBC-B841-AA2B-999E7B7F7BC7}"/>
+              </a:ext>
+            </a:extLst>
+          </p:cNvPr>
+          <p:cNvSpPr/>
+          <p:nvPr/>
+        </p:nvSpPr>
+        <p:spPr>
+          <a:xfrm>
+            <a:off x="9558562" y="5123065"/>
+            <a:ext cx="172482" cy="96089"/>
+          </a:xfrm>
+          <a:prstGeom prst="rect">
+            <a:avLst/>
+          </a:prstGeom>
+          <a:solidFill>
+            <a:srgbClr val="0070C0"/>
+          </a:solidFill>
+          <a:ln>
+            <a:solidFill>
+              <a:srgbClr val="0070C0"/>
+            </a:solidFill>
+          </a:ln>
+          <a:effectLst/>
+        </p:spPr>
+        <p:style>
+          <a:lnRef idx="1">
+            <a:schemeClr val="accent3"/>
+          </a:lnRef>
+          <a:fillRef idx="2">
+            <a:schemeClr val="accent3"/>
+          </a:fillRef>
+          <a:effectRef idx="1">
+            <a:schemeClr val="accent3"/>
+          </a:effectRef>
+          <a:fontRef idx="minor">
+            <a:schemeClr val="dk1"/>
+          </a:fontRef>
+        </p:style>
+        <p:txBody>
+          <a:bodyPr rtlCol="0" anchor="ctr"/>
+          <a:lstStyle/>
+          <a:p>
+            <a:pPr algn="ctr"/>
+            <a:endParaRPr lang="en-SG" sz="1400"/>
+          </a:p>
+        </p:txBody>
+      </p:sp>
+      <p:cxnSp>
+        <p:nvCxnSpPr>
+          <p:cNvPr id="113" name="Straight Arrow Connector 112">
+            <a:extLst>
+              <a:ext uri="{FF2B5EF4-FFF2-40B4-BE49-F238E27FC236}">
+                <a16:creationId xmlns:a16="http://schemas.microsoft.com/office/drawing/2014/main" id="{89501CA0-B3C8-A042-9F61-65B986BBE29C}"/>
+              </a:ext>
+            </a:extLst>
+          </p:cNvPr>
+          <p:cNvCxnSpPr>
+            <a:cxnSpLocks/>
+          </p:cNvCxnSpPr>
+          <p:nvPr/>
+        </p:nvCxnSpPr>
+        <p:spPr>
+          <a:xfrm>
+            <a:off x="6861447" y="5136552"/>
+            <a:ext cx="2715006" cy="0"/>
+          </a:xfrm>
+          <a:prstGeom prst="straightConnector1">
+            <a:avLst/>
+          </a:prstGeom>
+          <a:ln w="19050">
+            <a:solidFill>
+              <a:srgbClr val="0070C0"/>
+            </a:solidFill>
+            <a:tailEnd type="arrow"/>
+          </a:ln>
+        </p:spPr>
+        <p:style>
+          <a:lnRef idx="1">
+            <a:schemeClr val="accent1"/>
+          </a:lnRef>
+          <a:fillRef idx="0">
+            <a:schemeClr val="accent1"/>
+          </a:fillRef>
+          <a:effectRef idx="0">
+            <a:schemeClr val="accent1"/>
+          </a:effectRef>
+          <a:fontRef idx="minor">
+            <a:schemeClr val="tx1"/>
+          </a:fontRef>
+        </p:style>
+      </p:cxnSp>
+      <p:cxnSp>
+        <p:nvCxnSpPr>
+          <p:cNvPr id="114" name="Straight Arrow Connector 113">
+            <a:extLst>
+              <a:ext uri="{FF2B5EF4-FFF2-40B4-BE49-F238E27FC236}">
+                <a16:creationId xmlns:a16="http://schemas.microsoft.com/office/drawing/2014/main" id="{9405226F-D78E-EF43-8CA2-30FCC8FF991C}"/>
+              </a:ext>
+            </a:extLst>
+          </p:cNvPr>
+          <p:cNvCxnSpPr>
+            <a:cxnSpLocks/>
+          </p:cNvCxnSpPr>
+          <p:nvPr/>
+        </p:nvCxnSpPr>
+        <p:spPr>
+          <a:xfrm flipV="1">
+            <a:off x="6845032" y="5210449"/>
+            <a:ext cx="2740942" cy="6799"/>
+          </a:xfrm>
+          <a:prstGeom prst="straightConnector1">
+            <a:avLst/>
+          </a:prstGeom>
+          <a:ln w="19050">
+            <a:solidFill>
+              <a:schemeClr val="accent1"/>
+            </a:solidFill>
+            <a:prstDash val="sysDash"/>
+            <a:headEnd type="arrow" w="med" len="med"/>
+            <a:tailEnd type="none" w="med" len="med"/>
+          </a:ln>
+        </p:spPr>
+        <p:style>
+          <a:lnRef idx="1">
+            <a:schemeClr val="accent1"/>
+          </a:lnRef>
+          <a:fillRef idx="0">
+            <a:schemeClr val="accent1"/>
+          </a:fillRef>
+          <a:effectRef idx="0">
+            <a:schemeClr val="accent1"/>
+          </a:effectRef>
+          <a:fontRef idx="minor">
+            <a:schemeClr val="tx1"/>
+          </a:fontRef>
+        </p:style>
+      </p:cxnSp>
+      <p:sp>
+        <p:nvSpPr>
+          <p:cNvPr id="115" name="TextBox 114">
+            <a:extLst>
+              <a:ext uri="{FF2B5EF4-FFF2-40B4-BE49-F238E27FC236}">
+                <a16:creationId xmlns:a16="http://schemas.microsoft.com/office/drawing/2014/main" id="{BEB263BE-4F2B-EE47-9CDB-156785FBD749}"/>
+              </a:ext>
+            </a:extLst>
+          </p:cNvPr>
+          <p:cNvSpPr txBox="1"/>
+          <p:nvPr/>
+        </p:nvSpPr>
+        <p:spPr>
+          <a:xfrm>
+            <a:off x="7287811" y="4963329"/>
+            <a:ext cx="1862689" cy="215444"/>
+          </a:xfrm>
+          <a:prstGeom prst="rect">
+            <a:avLst/>
+          </a:prstGeom>
+          <a:noFill/>
+        </p:spPr>
+        <p:txBody>
+          <a:bodyPr wrap="square" lIns="0" tIns="0" rIns="0" bIns="0" rtlCol="0">
+            <a:spAutoFit/>
+          </a:bodyPr>
+          <a:lstStyle>
+            <a:defPPr>
+              <a:defRPr lang="en-US"/>
+            </a:defPPr>
+            <a:lvl1pPr algn="r">
+              <a:defRPr sz="1400">
+                <a:solidFill>
+                  <a:srgbClr val="0070C0"/>
+                </a:solidFill>
+              </a:defRPr>
+            </a:lvl1pPr>
+          </a:lstStyle>
+          <a:p>
+            <a:r>
+              <a:rPr lang="en-US" dirty="0" err="1"/>
+              <a:t>getDistOriginDest</a:t>
+            </a:r>
+            <a:r>
+              <a:rPr lang="en-US" dirty="0"/>
+              <a:t>()</a:t>
+            </a:r>
+          </a:p>
+        </p:txBody>
+      </p:sp>
+      <p:sp>
+        <p:nvSpPr>
+          <p:cNvPr id="116" name="Rectangle 115">
+            <a:extLst>
+              <a:ext uri="{FF2B5EF4-FFF2-40B4-BE49-F238E27FC236}">
+                <a16:creationId xmlns:a16="http://schemas.microsoft.com/office/drawing/2014/main" id="{D62323B5-7EAF-114B-8B1A-2858C5209477}"/>
+              </a:ext>
+            </a:extLst>
+          </p:cNvPr>
+          <p:cNvSpPr/>
+          <p:nvPr/>
+        </p:nvSpPr>
+        <p:spPr>
+          <a:xfrm>
+            <a:off x="9573006" y="5360718"/>
+            <a:ext cx="172482" cy="96089"/>
+          </a:xfrm>
+          <a:prstGeom prst="rect">
+            <a:avLst/>
+          </a:prstGeom>
+          <a:solidFill>
+            <a:srgbClr val="0070C0"/>
+          </a:solidFill>
+          <a:ln>
+            <a:solidFill>
+              <a:srgbClr val="0070C0"/>
+            </a:solidFill>
+          </a:ln>
+          <a:effectLst/>
+        </p:spPr>
+        <p:style>
+          <a:lnRef idx="1">
+            <a:schemeClr val="accent3"/>
+          </a:lnRef>
+          <a:fillRef idx="2">
+            <a:schemeClr val="accent3"/>
+          </a:fillRef>
+          <a:effectRef idx="1">
+            <a:schemeClr val="accent3"/>
+          </a:effectRef>
+          <a:fontRef idx="minor">
+            <a:schemeClr val="dk1"/>
+          </a:fontRef>
+        </p:style>
+        <p:txBody>
+          <a:bodyPr rtlCol="0" anchor="ctr"/>
+          <a:lstStyle/>
+          <a:p>
+            <a:pPr algn="ctr"/>
+            <a:endParaRPr lang="en-SG" sz="1400"/>
+          </a:p>
+        </p:txBody>
+      </p:sp>
+      <p:cxnSp>
+        <p:nvCxnSpPr>
+          <p:cNvPr id="117" name="Straight Arrow Connector 116">
+            <a:extLst>
+              <a:ext uri="{FF2B5EF4-FFF2-40B4-BE49-F238E27FC236}">
+                <a16:creationId xmlns:a16="http://schemas.microsoft.com/office/drawing/2014/main" id="{FBB46D70-24AB-944A-8692-73D053E71B85}"/>
+              </a:ext>
+            </a:extLst>
+          </p:cNvPr>
+          <p:cNvCxnSpPr>
+            <a:cxnSpLocks/>
+          </p:cNvCxnSpPr>
+          <p:nvPr/>
+        </p:nvCxnSpPr>
+        <p:spPr>
+          <a:xfrm>
+            <a:off x="6858000" y="5367745"/>
+            <a:ext cx="2715006" cy="0"/>
+          </a:xfrm>
+          <a:prstGeom prst="straightConnector1">
+            <a:avLst/>
+          </a:prstGeom>
+          <a:ln w="19050">
+            <a:solidFill>
+              <a:srgbClr val="0070C0"/>
+            </a:solidFill>
+            <a:tailEnd type="arrow"/>
+          </a:ln>
+        </p:spPr>
+        <p:style>
+          <a:lnRef idx="1">
+            <a:schemeClr val="accent1"/>
+          </a:lnRef>
+          <a:fillRef idx="0">
+            <a:schemeClr val="accent1"/>
+          </a:fillRef>
+          <a:effectRef idx="0">
+            <a:schemeClr val="accent1"/>
+          </a:effectRef>
+          <a:fontRef idx="minor">
+            <a:schemeClr val="tx1"/>
+          </a:fontRef>
+        </p:style>
+      </p:cxnSp>
+      <p:cxnSp>
+        <p:nvCxnSpPr>
+          <p:cNvPr id="118" name="Straight Arrow Connector 117">
+            <a:extLst>
+              <a:ext uri="{FF2B5EF4-FFF2-40B4-BE49-F238E27FC236}">
+                <a16:creationId xmlns:a16="http://schemas.microsoft.com/office/drawing/2014/main" id="{8FAF9F91-D665-204B-9AC4-6094262372ED}"/>
+              </a:ext>
+            </a:extLst>
+          </p:cNvPr>
+          <p:cNvCxnSpPr>
+            <a:cxnSpLocks/>
+          </p:cNvCxnSpPr>
+          <p:nvPr/>
+        </p:nvCxnSpPr>
+        <p:spPr>
+          <a:xfrm flipV="1">
+            <a:off x="6854172" y="5463180"/>
+            <a:ext cx="2740942" cy="6799"/>
+          </a:xfrm>
+          <a:prstGeom prst="straightConnector1">
+            <a:avLst/>
+          </a:prstGeom>
+          <a:ln w="19050">
+            <a:solidFill>
+              <a:schemeClr val="accent1"/>
+            </a:solidFill>
+            <a:prstDash val="sysDash"/>
+            <a:headEnd type="arrow" w="med" len="med"/>
+            <a:tailEnd type="none" w="med" len="med"/>
+          </a:ln>
+        </p:spPr>
+        <p:style>
+          <a:lnRef idx="1">
+            <a:schemeClr val="accent1"/>
+          </a:lnRef>
+          <a:fillRef idx="0">
+            <a:schemeClr val="accent1"/>
+          </a:fillRef>
+          <a:effectRef idx="0">
+            <a:schemeClr val="accent1"/>
+          </a:effectRef>
+          <a:fontRef idx="minor">
+            <a:schemeClr val="tx1"/>
+          </a:fontRef>
+        </p:style>
+      </p:cxnSp>
+      <p:sp>
+        <p:nvSpPr>
+          <p:cNvPr id="119" name="TextBox 118">
+            <a:extLst>
+              <a:ext uri="{FF2B5EF4-FFF2-40B4-BE49-F238E27FC236}">
+                <a16:creationId xmlns:a16="http://schemas.microsoft.com/office/drawing/2014/main" id="{DA470238-1847-1A44-8009-8438F48588C4}"/>
+              </a:ext>
+            </a:extLst>
+          </p:cNvPr>
+          <p:cNvSpPr txBox="1"/>
+          <p:nvPr/>
+        </p:nvSpPr>
+        <p:spPr>
+          <a:xfrm>
+            <a:off x="7255868" y="5185146"/>
+            <a:ext cx="1862689" cy="215444"/>
+          </a:xfrm>
+          <a:prstGeom prst="rect">
+            <a:avLst/>
+          </a:prstGeom>
+          <a:noFill/>
+        </p:spPr>
+        <p:txBody>
+          <a:bodyPr wrap="square" lIns="0" tIns="0" rIns="0" bIns="0" rtlCol="0">
+            <a:spAutoFit/>
+          </a:bodyPr>
+          <a:lstStyle>
+            <a:defPPr>
+              <a:defRPr lang="en-US"/>
+            </a:defPPr>
+            <a:lvl1pPr algn="r">
+              <a:defRPr sz="1400">
+                <a:solidFill>
+                  <a:srgbClr val="0070C0"/>
+                </a:solidFill>
+              </a:defRPr>
+            </a:lvl1pPr>
+          </a:lstStyle>
+          <a:p>
+            <a:r>
+              <a:rPr lang="en-US" dirty="0" err="1"/>
+              <a:t>getTravelTime</a:t>
+            </a:r>
+            <a:r>
+              <a:rPr lang="en-US" dirty="0"/>
+              <a:t>()</a:t>
+            </a:r>
           </a:p>
         </p:txBody>
       </p:sp>

</xml_diff>

<commit_message>
Update ugdg Add Project portfolio
</commit_message>
<xml_diff>
--- a/docs/diagrams/EstimateRouteSequenceDiagram.pptx
+++ b/docs/diagrams/EstimateRouteSequenceDiagram.pptx
@@ -208,7 +208,7 @@
           <a:p>
             <a:fld id="{F5CC4B3F-88C1-4FFA-B1B6-F41C21DC6924}" type="datetimeFigureOut">
               <a:rPr lang="en-US" smtClean="0"/>
-              <a:t>3/30/18</a:t>
+              <a:t>4/9/18</a:t>
             </a:fld>
             <a:endParaRPr lang="en-US"/>
           </a:p>
@@ -738,7 +738,7 @@
           <a:p>
             <a:fld id="{78C97017-6FC3-485B-9764-EAC9E56C1D49}" type="datetimeFigureOut">
               <a:rPr lang="en-US" smtClean="0"/>
-              <a:t>3/30/18</a:t>
+              <a:t>4/9/18</a:t>
             </a:fld>
             <a:endParaRPr lang="en-US"/>
           </a:p>
@@ -906,7 +906,7 @@
           <a:p>
             <a:fld id="{78C97017-6FC3-485B-9764-EAC9E56C1D49}" type="datetimeFigureOut">
               <a:rPr lang="en-US" smtClean="0"/>
-              <a:t>3/30/18</a:t>
+              <a:t>4/9/18</a:t>
             </a:fld>
             <a:endParaRPr lang="en-US"/>
           </a:p>
@@ -1084,7 +1084,7 @@
           <a:p>
             <a:fld id="{78C97017-6FC3-485B-9764-EAC9E56C1D49}" type="datetimeFigureOut">
               <a:rPr lang="en-US" smtClean="0"/>
-              <a:t>3/30/18</a:t>
+              <a:t>4/9/18</a:t>
             </a:fld>
             <a:endParaRPr lang="en-US"/>
           </a:p>
@@ -1252,7 +1252,7 @@
           <a:p>
             <a:fld id="{78C97017-6FC3-485B-9764-EAC9E56C1D49}" type="datetimeFigureOut">
               <a:rPr lang="en-US" smtClean="0"/>
-              <a:t>3/30/18</a:t>
+              <a:t>4/9/18</a:t>
             </a:fld>
             <a:endParaRPr lang="en-US"/>
           </a:p>
@@ -1497,7 +1497,7 @@
           <a:p>
             <a:fld id="{78C97017-6FC3-485B-9764-EAC9E56C1D49}" type="datetimeFigureOut">
               <a:rPr lang="en-US" smtClean="0"/>
-              <a:t>3/30/18</a:t>
+              <a:t>4/9/18</a:t>
             </a:fld>
             <a:endParaRPr lang="en-US"/>
           </a:p>
@@ -1782,7 +1782,7 @@
           <a:p>
             <a:fld id="{78C97017-6FC3-485B-9764-EAC9E56C1D49}" type="datetimeFigureOut">
               <a:rPr lang="en-US" smtClean="0"/>
-              <a:t>3/30/18</a:t>
+              <a:t>4/9/18</a:t>
             </a:fld>
             <a:endParaRPr lang="en-US"/>
           </a:p>
@@ -2201,7 +2201,7 @@
           <a:p>
             <a:fld id="{78C97017-6FC3-485B-9764-EAC9E56C1D49}" type="datetimeFigureOut">
               <a:rPr lang="en-US" smtClean="0"/>
-              <a:t>3/30/18</a:t>
+              <a:t>4/9/18</a:t>
             </a:fld>
             <a:endParaRPr lang="en-US"/>
           </a:p>
@@ -2318,7 +2318,7 @@
           <a:p>
             <a:fld id="{78C97017-6FC3-485B-9764-EAC9E56C1D49}" type="datetimeFigureOut">
               <a:rPr lang="en-US" smtClean="0"/>
-              <a:t>3/30/18</a:t>
+              <a:t>4/9/18</a:t>
             </a:fld>
             <a:endParaRPr lang="en-US"/>
           </a:p>
@@ -2413,7 +2413,7 @@
           <a:p>
             <a:fld id="{78C97017-6FC3-485B-9764-EAC9E56C1D49}" type="datetimeFigureOut">
               <a:rPr lang="en-US" smtClean="0"/>
-              <a:t>3/30/18</a:t>
+              <a:t>4/9/18</a:t>
             </a:fld>
             <a:endParaRPr lang="en-US"/>
           </a:p>
@@ -2688,7 +2688,7 @@
           <a:p>
             <a:fld id="{78C97017-6FC3-485B-9764-EAC9E56C1D49}" type="datetimeFigureOut">
               <a:rPr lang="en-US" smtClean="0"/>
-              <a:t>3/30/18</a:t>
+              <a:t>4/9/18</a:t>
             </a:fld>
             <a:endParaRPr lang="en-US"/>
           </a:p>
@@ -2940,7 +2940,7 @@
           <a:p>
             <a:fld id="{78C97017-6FC3-485B-9764-EAC9E56C1D49}" type="datetimeFigureOut">
               <a:rPr lang="en-US" smtClean="0"/>
-              <a:t>3/30/18</a:t>
+              <a:t>4/9/18</a:t>
             </a:fld>
             <a:endParaRPr lang="en-US"/>
           </a:p>
@@ -3151,7 +3151,7 @@
           <a:p>
             <a:fld id="{78C97017-6FC3-485B-9764-EAC9E56C1D49}" type="datetimeFigureOut">
               <a:rPr lang="en-US" smtClean="0"/>
-              <a:t>3/30/18</a:t>
+              <a:t>4/9/18</a:t>
             </a:fld>
             <a:endParaRPr lang="en-US"/>
           </a:p>
@@ -4349,7 +4349,9 @@
       <p:cxnSp>
         <p:nvCxnSpPr>
           <p:cNvPr id="37" name="Straight Arrow Connector 36"/>
-          <p:cNvCxnSpPr/>
+          <p:cNvCxnSpPr>
+            <a:cxnSpLocks/>
+          </p:cNvCxnSpPr>
           <p:nvPr/>
         </p:nvCxnSpPr>
         <p:spPr>
@@ -4832,7 +4834,9 @@
       <p:cxnSp>
         <p:nvCxnSpPr>
           <p:cNvPr id="90" name="Straight Arrow Connector 89"/>
-          <p:cNvCxnSpPr/>
+          <p:cNvCxnSpPr>
+            <a:cxnSpLocks/>
+          </p:cNvCxnSpPr>
           <p:nvPr/>
         </p:nvCxnSpPr>
         <p:spPr>
@@ -4994,7 +4998,9 @@
       <p:cxnSp>
         <p:nvCxnSpPr>
           <p:cNvPr id="8" name="Straight Arrow Connector 7"/>
-          <p:cNvCxnSpPr/>
+          <p:cNvCxnSpPr>
+            <a:cxnSpLocks/>
+          </p:cNvCxnSpPr>
           <p:nvPr/>
         </p:nvCxnSpPr>
         <p:spPr>
@@ -5161,7 +5167,9 @@
       <p:cxnSp>
         <p:nvCxnSpPr>
           <p:cNvPr id="51" name="Straight Arrow Connector 50"/>
-          <p:cNvCxnSpPr/>
+          <p:cNvCxnSpPr>
+            <a:cxnSpLocks/>
+          </p:cNvCxnSpPr>
           <p:nvPr/>
         </p:nvCxnSpPr>
         <p:spPr>
@@ -5199,7 +5207,9 @@
       <p:cxnSp>
         <p:nvCxnSpPr>
           <p:cNvPr id="13" name="Straight Arrow Connector 12"/>
-          <p:cNvCxnSpPr/>
+          <p:cNvCxnSpPr>
+            <a:cxnSpLocks/>
+          </p:cNvCxnSpPr>
           <p:nvPr/>
         </p:nvCxnSpPr>
         <p:spPr>
@@ -5271,7 +5281,9 @@
       <p:cxnSp>
         <p:nvCxnSpPr>
           <p:cNvPr id="52" name="Straight Arrow Connector 51"/>
-          <p:cNvCxnSpPr/>
+          <p:cNvCxnSpPr>
+            <a:cxnSpLocks/>
+          </p:cNvCxnSpPr>
           <p:nvPr/>
         </p:nvCxnSpPr>
         <p:spPr>
@@ -5323,7 +5335,7 @@
           <a:noFill/>
         </p:spPr>
         <p:txBody>
-          <a:bodyPr wrap="none" rtlCol="0">
+          <a:bodyPr wrap="square" rtlCol="0">
             <a:spAutoFit/>
           </a:bodyPr>
           <a:lstStyle/>
@@ -5692,23 +5704,11 @@
           </a:lstStyle>
           <a:p>
             <a:r>
-              <a:rPr lang="en-US" dirty="0" err="1">
-                <a:solidFill>
-                  <a:schemeClr val="accent1">
-                    <a:lumMod val="75000"/>
-                  </a:schemeClr>
-                </a:solidFill>
-              </a:rPr>
+              <a:rPr lang="en-US" dirty="0" err="1"/>
               <a:t>getDirectionRequest</a:t>
             </a:r>
             <a:r>
-              <a:rPr lang="en-US" dirty="0">
-                <a:solidFill>
-                  <a:schemeClr val="accent1">
-                    <a:lumMod val="75000"/>
-                  </a:schemeClr>
-                </a:solidFill>
-              </a:rPr>
+              <a:rPr lang="en-US" dirty="0"/>
               <a:t>()</a:t>
             </a:r>
           </a:p>
@@ -5840,7 +5840,7 @@
         <p:spPr>
           <a:xfrm>
             <a:off x="8474304" y="2486652"/>
-            <a:ext cx="31464" cy="3700339"/>
+            <a:ext cx="14108" cy="3836009"/>
           </a:xfrm>
           <a:prstGeom prst="line">
             <a:avLst/>
@@ -5882,8 +5882,8 @@
         </p:nvSpPr>
         <p:spPr>
           <a:xfrm>
-            <a:off x="8409485" y="3619369"/>
-            <a:ext cx="160218" cy="152400"/>
+            <a:off x="8379832" y="3645481"/>
+            <a:ext cx="189871" cy="126288"/>
           </a:xfrm>
           <a:prstGeom prst="rect">
             <a:avLst/>
@@ -6195,7 +6195,7 @@
         <p:spPr>
           <a:xfrm>
             <a:off x="9637243" y="3074697"/>
-            <a:ext cx="10987" cy="3153968"/>
+            <a:ext cx="19989" cy="3247964"/>
           </a:xfrm>
           <a:prstGeom prst="line">
             <a:avLst/>
@@ -6426,7 +6426,7 @@
         </p:nvSpPr>
         <p:spPr>
           <a:xfrm>
-            <a:off x="2213959" y="878537"/>
+            <a:off x="1957041" y="693894"/>
             <a:ext cx="5073852" cy="861774"/>
           </a:xfrm>
           <a:prstGeom prst="rect">
@@ -6876,8 +6876,8 @@
         </p:nvSpPr>
         <p:spPr>
           <a:xfrm>
-            <a:off x="9063314" y="3555908"/>
-            <a:ext cx="1827490" cy="215444"/>
+            <a:off x="9218984" y="3483161"/>
+            <a:ext cx="2056439" cy="215444"/>
           </a:xfrm>
           <a:prstGeom prst="rect">
             <a:avLst/>
@@ -7070,7 +7070,7 @@
         <p:spPr>
           <a:xfrm>
             <a:off x="7188003" y="3436361"/>
-            <a:ext cx="855809" cy="215444"/>
+            <a:ext cx="1000424" cy="215444"/>
           </a:xfrm>
           <a:prstGeom prst="rect">
             <a:avLst/>
@@ -7487,6 +7487,45 @@
             <a:r>
               <a:rPr lang="en-US" dirty="0"/>
               <a:t>()</a:t>
+            </a:r>
+          </a:p>
+        </p:txBody>
+      </p:sp>
+      <p:sp>
+        <p:nvSpPr>
+          <p:cNvPr id="102" name="TextBox 101">
+            <a:extLst>
+              <a:ext uri="{FF2B5EF4-FFF2-40B4-BE49-F238E27FC236}">
+                <a16:creationId xmlns:a16="http://schemas.microsoft.com/office/drawing/2014/main" id="{585E3451-A023-9249-82B4-78F60EB0F845}"/>
+              </a:ext>
+            </a:extLst>
+          </p:cNvPr>
+          <p:cNvSpPr txBox="1"/>
+          <p:nvPr/>
+        </p:nvSpPr>
+        <p:spPr>
+          <a:xfrm>
+            <a:off x="6641721" y="6266556"/>
+            <a:ext cx="258404" cy="261610"/>
+          </a:xfrm>
+          <a:prstGeom prst="rect">
+            <a:avLst/>
+          </a:prstGeom>
+          <a:noFill/>
+        </p:spPr>
+        <p:txBody>
+          <a:bodyPr wrap="square" rtlCol="0">
+            <a:spAutoFit/>
+          </a:bodyPr>
+          <a:lstStyle/>
+          <a:p>
+            <a:r>
+              <a:rPr lang="en-SG" sz="1100" dirty="0">
+                <a:solidFill>
+                  <a:srgbClr val="002060"/>
+                </a:solidFill>
+              </a:rPr>
+              <a:t>X</a:t>
             </a:r>
           </a:p>
         </p:txBody>

</xml_diff>

<commit_message>
Update sequence diagram for er and va
</commit_message>
<xml_diff>
--- a/docs/diagrams/EstimateRouteSequenceDiagram.pptx
+++ b/docs/diagrams/EstimateRouteSequenceDiagram.pptx
@@ -208,7 +208,7 @@
           <a:p>
             <a:fld id="{F5CC4B3F-88C1-4FFA-B1B6-F41C21DC6924}" type="datetimeFigureOut">
               <a:rPr lang="en-US" smtClean="0"/>
-              <a:t>4/9/18</a:t>
+              <a:t>4/14/2018</a:t>
             </a:fld>
             <a:endParaRPr lang="en-US"/>
           </a:p>
@@ -738,7 +738,7 @@
           <a:p>
             <a:fld id="{78C97017-6FC3-485B-9764-EAC9E56C1D49}" type="datetimeFigureOut">
               <a:rPr lang="en-US" smtClean="0"/>
-              <a:t>4/9/18</a:t>
+              <a:t>4/14/2018</a:t>
             </a:fld>
             <a:endParaRPr lang="en-US"/>
           </a:p>
@@ -906,7 +906,7 @@
           <a:p>
             <a:fld id="{78C97017-6FC3-485B-9764-EAC9E56C1D49}" type="datetimeFigureOut">
               <a:rPr lang="en-US" smtClean="0"/>
-              <a:t>4/9/18</a:t>
+              <a:t>4/14/2018</a:t>
             </a:fld>
             <a:endParaRPr lang="en-US"/>
           </a:p>
@@ -1084,7 +1084,7 @@
           <a:p>
             <a:fld id="{78C97017-6FC3-485B-9764-EAC9E56C1D49}" type="datetimeFigureOut">
               <a:rPr lang="en-US" smtClean="0"/>
-              <a:t>4/9/18</a:t>
+              <a:t>4/14/2018</a:t>
             </a:fld>
             <a:endParaRPr lang="en-US"/>
           </a:p>
@@ -1252,7 +1252,7 @@
           <a:p>
             <a:fld id="{78C97017-6FC3-485B-9764-EAC9E56C1D49}" type="datetimeFigureOut">
               <a:rPr lang="en-US" smtClean="0"/>
-              <a:t>4/9/18</a:t>
+              <a:t>4/14/2018</a:t>
             </a:fld>
             <a:endParaRPr lang="en-US"/>
           </a:p>
@@ -1497,7 +1497,7 @@
           <a:p>
             <a:fld id="{78C97017-6FC3-485B-9764-EAC9E56C1D49}" type="datetimeFigureOut">
               <a:rPr lang="en-US" smtClean="0"/>
-              <a:t>4/9/18</a:t>
+              <a:t>4/14/2018</a:t>
             </a:fld>
             <a:endParaRPr lang="en-US"/>
           </a:p>
@@ -1782,7 +1782,7 @@
           <a:p>
             <a:fld id="{78C97017-6FC3-485B-9764-EAC9E56C1D49}" type="datetimeFigureOut">
               <a:rPr lang="en-US" smtClean="0"/>
-              <a:t>4/9/18</a:t>
+              <a:t>4/14/2018</a:t>
             </a:fld>
             <a:endParaRPr lang="en-US"/>
           </a:p>
@@ -2201,7 +2201,7 @@
           <a:p>
             <a:fld id="{78C97017-6FC3-485B-9764-EAC9E56C1D49}" type="datetimeFigureOut">
               <a:rPr lang="en-US" smtClean="0"/>
-              <a:t>4/9/18</a:t>
+              <a:t>4/14/2018</a:t>
             </a:fld>
             <a:endParaRPr lang="en-US"/>
           </a:p>
@@ -2318,7 +2318,7 @@
           <a:p>
             <a:fld id="{78C97017-6FC3-485B-9764-EAC9E56C1D49}" type="datetimeFigureOut">
               <a:rPr lang="en-US" smtClean="0"/>
-              <a:t>4/9/18</a:t>
+              <a:t>4/14/2018</a:t>
             </a:fld>
             <a:endParaRPr lang="en-US"/>
           </a:p>
@@ -2413,7 +2413,7 @@
           <a:p>
             <a:fld id="{78C97017-6FC3-485B-9764-EAC9E56C1D49}" type="datetimeFigureOut">
               <a:rPr lang="en-US" smtClean="0"/>
-              <a:t>4/9/18</a:t>
+              <a:t>4/14/2018</a:t>
             </a:fld>
             <a:endParaRPr lang="en-US"/>
           </a:p>
@@ -2688,7 +2688,7 @@
           <a:p>
             <a:fld id="{78C97017-6FC3-485B-9764-EAC9E56C1D49}" type="datetimeFigureOut">
               <a:rPr lang="en-US" smtClean="0"/>
-              <a:t>4/9/18</a:t>
+              <a:t>4/14/2018</a:t>
             </a:fld>
             <a:endParaRPr lang="en-US"/>
           </a:p>
@@ -2940,7 +2940,7 @@
           <a:p>
             <a:fld id="{78C97017-6FC3-485B-9764-EAC9E56C1D49}" type="datetimeFigureOut">
               <a:rPr lang="en-US" smtClean="0"/>
-              <a:t>4/9/18</a:t>
+              <a:t>4/14/2018</a:t>
             </a:fld>
             <a:endParaRPr lang="en-US"/>
           </a:p>
@@ -3151,7 +3151,7 @@
           <a:p>
             <a:fld id="{78C97017-6FC3-485B-9764-EAC9E56C1D49}" type="datetimeFigureOut">
               <a:rPr lang="en-US" smtClean="0"/>
-              <a:t>4/9/18</a:t>
+              <a:t>4/14/2018</a:t>
             </a:fld>
             <a:endParaRPr lang="en-US"/>
           </a:p>
@@ -3534,8 +3534,8 @@
         </p:nvSpPr>
         <p:spPr>
           <a:xfrm>
-            <a:off x="-336089" y="1878703"/>
-            <a:ext cx="11232689" cy="4610099"/>
+            <a:off x="-336089" y="1893217"/>
+            <a:ext cx="11249777" cy="5040999"/>
           </a:xfrm>
           <a:prstGeom prst="roundRect">
             <a:avLst>
@@ -3702,7 +3702,7 @@
         <p:spPr>
           <a:xfrm>
             <a:off x="875243" y="2646992"/>
-            <a:ext cx="171473" cy="3737077"/>
+            <a:ext cx="211299" cy="4134806"/>
           </a:xfrm>
           <a:prstGeom prst="rect">
             <a:avLst/>
@@ -3857,8 +3857,8 @@
         </p:nvSpPr>
         <p:spPr>
           <a:xfrm>
-            <a:off x="2999167" y="2869167"/>
-            <a:ext cx="186830" cy="1584678"/>
+            <a:off x="2999167" y="2869166"/>
+            <a:ext cx="184319" cy="1697771"/>
           </a:xfrm>
           <a:prstGeom prst="rect">
             <a:avLst/>
@@ -3979,14 +3979,13 @@
           <p:cNvPr id="20" name="Straight Connector 19"/>
           <p:cNvCxnSpPr>
             <a:cxnSpLocks/>
-            <a:stCxn id="21" idx="0"/>
           </p:cNvCxnSpPr>
           <p:nvPr/>
         </p:nvCxnSpPr>
         <p:spPr>
           <a:xfrm>
-            <a:off x="6762978" y="3282452"/>
-            <a:ext cx="7945" cy="3101617"/>
+            <a:off x="6768150" y="3413256"/>
+            <a:ext cx="21367" cy="3300616"/>
           </a:xfrm>
           <a:prstGeom prst="line">
             <a:avLst/>
@@ -4022,8 +4021,8 @@
         </p:nvSpPr>
         <p:spPr>
           <a:xfrm>
-            <a:off x="6684882" y="3282452"/>
-            <a:ext cx="156191" cy="1073772"/>
+            <a:off x="6684882" y="3282451"/>
+            <a:ext cx="164590" cy="1171393"/>
           </a:xfrm>
           <a:prstGeom prst="rect">
             <a:avLst/>
@@ -4233,7 +4232,7 @@
         </p:nvSpPr>
         <p:spPr>
           <a:xfrm>
-            <a:off x="3654857" y="4500963"/>
+            <a:off x="3504920" y="4639975"/>
             <a:ext cx="855809" cy="215444"/>
           </a:xfrm>
           <a:prstGeom prst="rect">
@@ -4274,9 +4273,9 @@
           <p:nvPr/>
         </p:nvCxnSpPr>
         <p:spPr>
-          <a:xfrm>
-            <a:off x="4961353" y="4267200"/>
-            <a:ext cx="1789421" cy="0"/>
+          <a:xfrm flipV="1">
+            <a:off x="4943348" y="4450424"/>
+            <a:ext cx="1711876" cy="3420"/>
           </a:xfrm>
           <a:prstGeom prst="straightConnector1">
             <a:avLst/>
@@ -4310,14 +4309,13 @@
           <p:cNvPr id="35" name="Straight Arrow Connector 34"/>
           <p:cNvCxnSpPr>
             <a:cxnSpLocks/>
-            <a:endCxn id="18" idx="2"/>
           </p:cNvCxnSpPr>
           <p:nvPr/>
         </p:nvCxnSpPr>
         <p:spPr>
           <a:xfrm>
-            <a:off x="1028701" y="4438755"/>
-            <a:ext cx="2063881" cy="15090"/>
+            <a:off x="1031434" y="4566937"/>
+            <a:ext cx="2011296" cy="0"/>
           </a:xfrm>
           <a:prstGeom prst="straightConnector1">
             <a:avLst/>
@@ -4356,7 +4354,7 @@
         </p:nvCxnSpPr>
         <p:spPr>
           <a:xfrm>
-            <a:off x="-336089" y="6384069"/>
+            <a:off x="-320808" y="6781251"/>
             <a:ext cx="1196051" cy="0"/>
           </a:xfrm>
           <a:prstGeom prst="straightConnector1">
@@ -4396,7 +4394,7 @@
         </p:nvCxnSpPr>
         <p:spPr>
           <a:xfrm flipV="1">
-            <a:off x="1060994" y="4513785"/>
+            <a:off x="1058496" y="4626735"/>
             <a:ext cx="5652560" cy="7220"/>
           </a:xfrm>
           <a:prstGeom prst="straightConnector1">
@@ -4432,8 +4430,8 @@
         </p:nvSpPr>
         <p:spPr>
           <a:xfrm>
-            <a:off x="6705600" y="4531470"/>
-            <a:ext cx="135473" cy="1724546"/>
+            <a:off x="6705602" y="4617354"/>
+            <a:ext cx="143556" cy="1919422"/>
           </a:xfrm>
           <a:prstGeom prst="rect">
             <a:avLst/>
@@ -4481,7 +4479,7 @@
         </p:nvCxnSpPr>
         <p:spPr>
           <a:xfrm flipV="1">
-            <a:off x="6858000" y="4572000"/>
+            <a:off x="6837611" y="4688042"/>
             <a:ext cx="4437778" cy="16180"/>
           </a:xfrm>
           <a:prstGeom prst="straightConnector1">
@@ -4519,7 +4517,7 @@
         </p:nvCxnSpPr>
         <p:spPr>
           <a:xfrm flipV="1">
-            <a:off x="6846116" y="4698965"/>
+            <a:off x="6846703" y="4828292"/>
             <a:ext cx="4448418" cy="11026"/>
           </a:xfrm>
           <a:prstGeom prst="straightConnector1">
@@ -4559,7 +4557,7 @@
         </p:nvCxnSpPr>
         <p:spPr>
           <a:xfrm>
-            <a:off x="1031434" y="6256016"/>
+            <a:off x="1093011" y="6536776"/>
             <a:ext cx="5674166" cy="0"/>
           </a:xfrm>
           <a:prstGeom prst="straightConnector1">
@@ -4645,7 +4643,7 @@
         </p:nvSpPr>
         <p:spPr>
           <a:xfrm>
-            <a:off x="3814848" y="5911615"/>
+            <a:off x="3574168" y="6296157"/>
             <a:ext cx="621216" cy="215444"/>
           </a:xfrm>
           <a:prstGeom prst="rect">
@@ -4685,7 +4683,7 @@
         </p:nvSpPr>
         <p:spPr>
           <a:xfrm>
-            <a:off x="-115620" y="6107217"/>
+            <a:off x="-248458" y="6536781"/>
             <a:ext cx="762000" cy="215444"/>
           </a:xfrm>
           <a:prstGeom prst="rect">
@@ -4725,7 +4723,7 @@
         </p:nvSpPr>
         <p:spPr>
           <a:xfrm>
-            <a:off x="7030893" y="5546089"/>
+            <a:off x="7030893" y="5926070"/>
             <a:ext cx="1590354" cy="461538"/>
           </a:xfrm>
           <a:prstGeom prst="rect">
@@ -4792,7 +4790,7 @@
         </p:nvSpPr>
         <p:spPr>
           <a:xfrm>
-            <a:off x="7732382" y="6007626"/>
+            <a:off x="7701526" y="6362312"/>
             <a:ext cx="170015" cy="114317"/>
           </a:xfrm>
           <a:prstGeom prst="rect">
@@ -4841,7 +4839,7 @@
         </p:nvCxnSpPr>
         <p:spPr>
           <a:xfrm>
-            <a:off x="6819669" y="6131821"/>
+            <a:off x="6851983" y="6488802"/>
             <a:ext cx="966624" cy="0"/>
           </a:xfrm>
           <a:prstGeom prst="straightConnector1">
@@ -4879,7 +4877,7 @@
         </p:nvSpPr>
         <p:spPr>
           <a:xfrm>
-            <a:off x="2174527" y="4198353"/>
+            <a:off x="2055319" y="4321961"/>
             <a:ext cx="220343" cy="215444"/>
           </a:xfrm>
           <a:prstGeom prst="rect">
@@ -5089,7 +5087,7 @@
         <p:spPr>
           <a:xfrm>
             <a:off x="4860412" y="2907163"/>
-            <a:ext cx="0" cy="1512437"/>
+            <a:ext cx="641" cy="1797315"/>
           </a:xfrm>
           <a:prstGeom prst="line">
             <a:avLst/>
@@ -5125,8 +5123,8 @@
         </p:nvSpPr>
         <p:spPr>
           <a:xfrm>
-            <a:off x="4758536" y="3226266"/>
-            <a:ext cx="216697" cy="1129956"/>
+            <a:off x="4758537" y="3226266"/>
+            <a:ext cx="189254" cy="1278472"/>
           </a:xfrm>
           <a:prstGeom prst="rect">
             <a:avLst/>
@@ -5174,7 +5172,7 @@
         </p:nvCxnSpPr>
         <p:spPr>
           <a:xfrm>
-            <a:off x="3187241" y="4343400"/>
+            <a:off x="3174096" y="4504738"/>
             <a:ext cx="1667219" cy="0"/>
           </a:xfrm>
           <a:prstGeom prst="straightConnector1">
@@ -5214,7 +5212,7 @@
         </p:nvCxnSpPr>
         <p:spPr>
           <a:xfrm>
-            <a:off x="6868647" y="5577203"/>
+            <a:off x="6868647" y="5920847"/>
             <a:ext cx="162246" cy="0"/>
           </a:xfrm>
           <a:prstGeom prst="straightConnector1">
@@ -5326,7 +5324,7 @@
         </p:nvSpPr>
         <p:spPr>
           <a:xfrm>
-            <a:off x="4724400" y="4343400"/>
+            <a:off x="4732885" y="4585602"/>
             <a:ext cx="258404" cy="261610"/>
           </a:xfrm>
           <a:prstGeom prst="rect">
@@ -5423,7 +5421,7 @@
         </p:nvCxnSpPr>
         <p:spPr>
           <a:xfrm flipV="1">
-            <a:off x="6855181" y="4086176"/>
+            <a:off x="6871403" y="5364461"/>
             <a:ext cx="4439384" cy="26064"/>
           </a:xfrm>
           <a:prstGeom prst="straightConnector1">
@@ -5530,7 +5528,7 @@
         </p:nvSpPr>
         <p:spPr>
           <a:xfrm>
-            <a:off x="11300831" y="4063457"/>
+            <a:off x="11316218" y="5346428"/>
             <a:ext cx="200066" cy="127544"/>
           </a:xfrm>
           <a:prstGeom prst="rect">
@@ -5628,7 +5626,7 @@
         </p:nvSpPr>
         <p:spPr>
           <a:xfrm>
-            <a:off x="9577784" y="3905934"/>
+            <a:off x="9915388" y="5158811"/>
             <a:ext cx="998300" cy="215444"/>
           </a:xfrm>
           <a:prstGeom prst="rect">
@@ -5678,7 +5676,7 @@
         </p:nvSpPr>
         <p:spPr>
           <a:xfrm>
-            <a:off x="8307779" y="4311118"/>
+            <a:off x="8387374" y="4424531"/>
             <a:ext cx="2854157" cy="215444"/>
           </a:xfrm>
           <a:prstGeom prst="rect">
@@ -5705,7 +5703,7 @@
           <a:p>
             <a:r>
               <a:rPr lang="en-US" dirty="0" err="1"/>
-              <a:t>getDirectionRequest</a:t>
+              <a:t>Map.getDirectionService</a:t>
             </a:r>
             <a:r>
               <a:rPr lang="en-US" dirty="0"/>
@@ -6027,8 +6025,8 @@
         </p:nvSpPr>
         <p:spPr>
           <a:xfrm>
-            <a:off x="11321619" y="4552310"/>
-            <a:ext cx="172749" cy="145180"/>
+            <a:off x="11275389" y="4686677"/>
+            <a:ext cx="236631" cy="140937"/>
           </a:xfrm>
           <a:prstGeom prst="rect">
             <a:avLst/>
@@ -6080,7 +6078,7 @@
         </p:nvSpPr>
         <p:spPr>
           <a:xfrm>
-            <a:off x="4111410" y="4121378"/>
+            <a:off x="3943882" y="4259395"/>
             <a:ext cx="220343" cy="215444"/>
           </a:xfrm>
           <a:prstGeom prst="rect">
@@ -6237,8 +6235,8 @@
         </p:nvSpPr>
         <p:spPr>
           <a:xfrm>
-            <a:off x="9574639" y="4905576"/>
-            <a:ext cx="172482" cy="96089"/>
+            <a:off x="9525000" y="3810727"/>
+            <a:ext cx="206044" cy="94047"/>
           </a:xfrm>
           <a:prstGeom prst="rect">
             <a:avLst/>
@@ -6292,7 +6290,7 @@
         </p:nvCxnSpPr>
         <p:spPr>
           <a:xfrm>
-            <a:off x="6858000" y="4905576"/>
+            <a:off x="6813758" y="3819338"/>
             <a:ext cx="2715006" cy="0"/>
           </a:xfrm>
           <a:prstGeom prst="straightConnector1">
@@ -6336,7 +6334,7 @@
         </p:nvCxnSpPr>
         <p:spPr>
           <a:xfrm flipV="1">
-            <a:off x="6861447" y="5000729"/>
+            <a:off x="6835657" y="3899259"/>
             <a:ext cx="2740942" cy="6799"/>
           </a:xfrm>
           <a:prstGeom prst="straightConnector1">
@@ -6380,7 +6378,7 @@
         </p:nvSpPr>
         <p:spPr>
           <a:xfrm>
-            <a:off x="6535889" y="4709830"/>
+            <a:off x="7557067" y="3569810"/>
             <a:ext cx="1862689" cy="215444"/>
           </a:xfrm>
           <a:prstGeom prst="rect">
@@ -6689,7 +6687,7 @@
         </p:nvCxnSpPr>
         <p:spPr>
           <a:xfrm>
-            <a:off x="6832064" y="4191000"/>
+            <a:off x="6845222" y="5473972"/>
             <a:ext cx="4462501" cy="0"/>
           </a:xfrm>
           <a:prstGeom prst="straightConnector1">
@@ -6733,8 +6731,8 @@
         </p:nvSpPr>
         <p:spPr>
           <a:xfrm>
-            <a:off x="11306134" y="3810000"/>
-            <a:ext cx="194763" cy="95934"/>
+            <a:off x="9514020" y="4301922"/>
+            <a:ext cx="215337" cy="72106"/>
           </a:xfrm>
           <a:prstGeom prst="rect">
             <a:avLst/>
@@ -6788,7 +6786,7 @@
         </p:nvCxnSpPr>
         <p:spPr>
           <a:xfrm>
-            <a:off x="6855181" y="3919722"/>
+            <a:off x="6845222" y="5175613"/>
             <a:ext cx="4462501" cy="0"/>
           </a:xfrm>
           <a:prstGeom prst="straightConnector1">
@@ -6834,8 +6832,8 @@
         </p:nvCxnSpPr>
         <p:spPr>
           <a:xfrm flipV="1">
-            <a:off x="6878298" y="3796049"/>
-            <a:ext cx="4439384" cy="26064"/>
+            <a:off x="6759960" y="5052293"/>
+            <a:ext cx="4551169" cy="14978"/>
           </a:xfrm>
           <a:prstGeom prst="straightConnector1">
             <a:avLst/>
@@ -6876,7 +6874,7 @@
         </p:nvSpPr>
         <p:spPr>
           <a:xfrm>
-            <a:off x="9218984" y="3483161"/>
+            <a:off x="9292922" y="4816036"/>
             <a:ext cx="2056439" cy="215444"/>
           </a:xfrm>
           <a:prstGeom prst="rect">
@@ -7119,8 +7117,8 @@
         </p:nvSpPr>
         <p:spPr>
           <a:xfrm>
-            <a:off x="9558562" y="5123065"/>
-            <a:ext cx="172482" cy="96089"/>
+            <a:off x="9525140" y="4071139"/>
+            <a:ext cx="204310" cy="71793"/>
           </a:xfrm>
           <a:prstGeom prst="rect">
             <a:avLst/>
@@ -7174,7 +7172,7 @@
         </p:nvCxnSpPr>
         <p:spPr>
           <a:xfrm>
-            <a:off x="6861447" y="5136552"/>
+            <a:off x="6830924" y="4089812"/>
             <a:ext cx="2715006" cy="0"/>
           </a:xfrm>
           <a:prstGeom prst="straightConnector1">
@@ -7218,7 +7216,7 @@
         </p:nvCxnSpPr>
         <p:spPr>
           <a:xfrm flipV="1">
-            <a:off x="6845032" y="5210449"/>
+            <a:off x="6843331" y="4152229"/>
             <a:ext cx="2740942" cy="6799"/>
           </a:xfrm>
           <a:prstGeom prst="straightConnector1">
@@ -7262,8 +7260,8 @@
         </p:nvSpPr>
         <p:spPr>
           <a:xfrm>
-            <a:off x="7287811" y="4963329"/>
-            <a:ext cx="1862689" cy="215444"/>
+            <a:off x="6557375" y="3875634"/>
+            <a:ext cx="2611714" cy="215444"/>
           </a:xfrm>
           <a:prstGeom prst="rect">
             <a:avLst/>
@@ -7289,7 +7287,7 @@
           <a:p>
             <a:r>
               <a:rPr lang="en-US" dirty="0" err="1"/>
-              <a:t>getDistOriginDest</a:t>
+              <a:t>getDistBetweentOriginDest</a:t>
             </a:r>
             <a:r>
               <a:rPr lang="en-US" dirty="0"/>
@@ -7312,8 +7310,8 @@
         </p:nvSpPr>
         <p:spPr>
           <a:xfrm>
-            <a:off x="9573006" y="5360718"/>
-            <a:ext cx="172482" cy="96089"/>
+            <a:off x="11298568" y="5031304"/>
+            <a:ext cx="212589" cy="140937"/>
           </a:xfrm>
           <a:prstGeom prst="rect">
             <a:avLst/>
@@ -7367,7 +7365,7 @@
         </p:nvCxnSpPr>
         <p:spPr>
           <a:xfrm>
-            <a:off x="6858000" y="5367745"/>
+            <a:off x="6813758" y="4329385"/>
             <a:ext cx="2715006" cy="0"/>
           </a:xfrm>
           <a:prstGeom prst="straightConnector1">
@@ -7411,7 +7409,7 @@
         </p:nvCxnSpPr>
         <p:spPr>
           <a:xfrm flipV="1">
-            <a:off x="6854172" y="5463180"/>
+            <a:off x="6846930" y="4395389"/>
             <a:ext cx="2740942" cy="6799"/>
           </a:xfrm>
           <a:prstGeom prst="straightConnector1">
@@ -7455,7 +7453,7 @@
         </p:nvSpPr>
         <p:spPr>
           <a:xfrm>
-            <a:off x="7255868" y="5185146"/>
+            <a:off x="6447229" y="4125774"/>
             <a:ext cx="1862689" cy="215444"/>
           </a:xfrm>
           <a:prstGeom prst="rect">
@@ -7505,7 +7503,7 @@
         </p:nvSpPr>
         <p:spPr>
           <a:xfrm>
-            <a:off x="6641721" y="6266556"/>
+            <a:off x="6659342" y="6583067"/>
             <a:ext cx="258404" cy="261610"/>
           </a:xfrm>
           <a:prstGeom prst="rect">
@@ -7527,6 +7525,293 @@
               </a:rPr>
               <a:t>X</a:t>
             </a:r>
+          </a:p>
+        </p:txBody>
+      </p:sp>
+      <p:sp>
+        <p:nvSpPr>
+          <p:cNvPr id="111" name="TextBox 110">
+            <a:extLst>
+              <a:ext uri="{FF2B5EF4-FFF2-40B4-BE49-F238E27FC236}">
+                <a16:creationId xmlns:a16="http://schemas.microsoft.com/office/drawing/2014/main" id="{49A431CD-5719-4E04-BB81-F174E6C004AA}"/>
+              </a:ext>
+            </a:extLst>
+          </p:cNvPr>
+          <p:cNvSpPr txBox="1"/>
+          <p:nvPr/>
+        </p:nvSpPr>
+        <p:spPr>
+          <a:xfrm>
+            <a:off x="5418143" y="4801880"/>
+            <a:ext cx="2854157" cy="215444"/>
+          </a:xfrm>
+          <a:prstGeom prst="rect">
+            <a:avLst/>
+          </a:prstGeom>
+          <a:noFill/>
+        </p:spPr>
+        <p:txBody>
+          <a:bodyPr wrap="square" lIns="0" tIns="0" rIns="0" bIns="0" rtlCol="0">
+            <a:spAutoFit/>
+          </a:bodyPr>
+          <a:lstStyle>
+            <a:defPPr>
+              <a:defRPr lang="en-US"/>
+            </a:defPPr>
+            <a:lvl1pPr algn="r">
+              <a:defRPr sz="1400">
+                <a:solidFill>
+                  <a:srgbClr val="0070C0"/>
+                </a:solidFill>
+              </a:defRPr>
+            </a:lvl1pPr>
+          </a:lstStyle>
+          <a:p>
+            <a:r>
+              <a:rPr lang="en-US" dirty="0" err="1"/>
+              <a:t>directionService</a:t>
+            </a:r>
+            <a:endParaRPr lang="en-US" dirty="0"/>
+          </a:p>
+        </p:txBody>
+      </p:sp>
+      <p:sp>
+        <p:nvSpPr>
+          <p:cNvPr id="120" name="Rectangle 119">
+            <a:extLst>
+              <a:ext uri="{FF2B5EF4-FFF2-40B4-BE49-F238E27FC236}">
+                <a16:creationId xmlns:a16="http://schemas.microsoft.com/office/drawing/2014/main" id="{3561FD00-C966-4010-AB03-AB7FA56439BA}"/>
+              </a:ext>
+            </a:extLst>
+          </p:cNvPr>
+          <p:cNvSpPr/>
+          <p:nvPr/>
+        </p:nvSpPr>
+        <p:spPr>
+          <a:xfrm flipV="1">
+            <a:off x="11298953" y="5691055"/>
+            <a:ext cx="208462" cy="104970"/>
+          </a:xfrm>
+          <a:prstGeom prst="rect">
+            <a:avLst/>
+          </a:prstGeom>
+          <a:solidFill>
+            <a:srgbClr val="0070C0"/>
+          </a:solidFill>
+          <a:ln>
+            <a:solidFill>
+              <a:srgbClr val="0070C0"/>
+            </a:solidFill>
+          </a:ln>
+          <a:effectLst/>
+        </p:spPr>
+        <p:style>
+          <a:lnRef idx="1">
+            <a:schemeClr val="accent3"/>
+          </a:lnRef>
+          <a:fillRef idx="2">
+            <a:schemeClr val="accent3"/>
+          </a:fillRef>
+          <a:effectRef idx="1">
+            <a:schemeClr val="accent3"/>
+          </a:effectRef>
+          <a:fontRef idx="minor">
+            <a:schemeClr val="dk1"/>
+          </a:fontRef>
+        </p:style>
+        <p:txBody>
+          <a:bodyPr rtlCol="0" anchor="ctr"/>
+          <a:lstStyle/>
+          <a:p>
+            <a:pPr algn="ctr"/>
+            <a:endParaRPr lang="en-SG" sz="1400"/>
+          </a:p>
+        </p:txBody>
+      </p:sp>
+      <p:cxnSp>
+        <p:nvCxnSpPr>
+          <p:cNvPr id="121" name="Straight Arrow Connector 120">
+            <a:extLst>
+              <a:ext uri="{FF2B5EF4-FFF2-40B4-BE49-F238E27FC236}">
+                <a16:creationId xmlns:a16="http://schemas.microsoft.com/office/drawing/2014/main" id="{03035797-1D8C-498F-A7DD-94547A964C4C}"/>
+              </a:ext>
+            </a:extLst>
+          </p:cNvPr>
+          <p:cNvCxnSpPr>
+            <a:cxnSpLocks/>
+          </p:cNvCxnSpPr>
+          <p:nvPr/>
+        </p:nvCxnSpPr>
+        <p:spPr>
+          <a:xfrm>
+            <a:off x="6857088" y="5791200"/>
+            <a:ext cx="4462501" cy="0"/>
+          </a:xfrm>
+          <a:prstGeom prst="straightConnector1">
+            <a:avLst/>
+          </a:prstGeom>
+          <a:ln w="19050">
+            <a:solidFill>
+              <a:srgbClr val="0070C0"/>
+            </a:solidFill>
+            <a:prstDash val="sysDash"/>
+            <a:headEnd type="arrow" w="med" len="med"/>
+            <a:tailEnd type="none" w="med" len="med"/>
+          </a:ln>
+        </p:spPr>
+        <p:style>
+          <a:lnRef idx="1">
+            <a:schemeClr val="accent1"/>
+          </a:lnRef>
+          <a:fillRef idx="0">
+            <a:schemeClr val="accent1"/>
+          </a:fillRef>
+          <a:effectRef idx="0">
+            <a:schemeClr val="accent1"/>
+          </a:effectRef>
+          <a:fontRef idx="minor">
+            <a:schemeClr val="tx1"/>
+          </a:fontRef>
+        </p:style>
+      </p:cxnSp>
+      <p:cxnSp>
+        <p:nvCxnSpPr>
+          <p:cNvPr id="122" name="Straight Arrow Connector 121">
+            <a:extLst>
+              <a:ext uri="{FF2B5EF4-FFF2-40B4-BE49-F238E27FC236}">
+                <a16:creationId xmlns:a16="http://schemas.microsoft.com/office/drawing/2014/main" id="{0470510C-6CA9-4CA5-89EF-2FEB5AC61C46}"/>
+              </a:ext>
+            </a:extLst>
+          </p:cNvPr>
+          <p:cNvCxnSpPr>
+            <a:cxnSpLocks/>
+          </p:cNvCxnSpPr>
+          <p:nvPr/>
+        </p:nvCxnSpPr>
+        <p:spPr>
+          <a:xfrm flipV="1">
+            <a:off x="6868647" y="5701166"/>
+            <a:ext cx="4439384" cy="26064"/>
+          </a:xfrm>
+          <a:prstGeom prst="straightConnector1">
+            <a:avLst/>
+          </a:prstGeom>
+          <a:ln w="19050">
+            <a:solidFill>
+              <a:srgbClr val="0070C0"/>
+            </a:solidFill>
+            <a:tailEnd type="arrow"/>
+          </a:ln>
+        </p:spPr>
+        <p:style>
+          <a:lnRef idx="1">
+            <a:schemeClr val="accent1"/>
+          </a:lnRef>
+          <a:fillRef idx="0">
+            <a:schemeClr val="accent1"/>
+          </a:fillRef>
+          <a:effectRef idx="0">
+            <a:schemeClr val="accent1"/>
+          </a:effectRef>
+          <a:fontRef idx="minor">
+            <a:schemeClr val="tx1"/>
+          </a:fontRef>
+        </p:style>
+      </p:cxnSp>
+      <p:sp>
+        <p:nvSpPr>
+          <p:cNvPr id="123" name="TextBox 122">
+            <a:extLst>
+              <a:ext uri="{FF2B5EF4-FFF2-40B4-BE49-F238E27FC236}">
+                <a16:creationId xmlns:a16="http://schemas.microsoft.com/office/drawing/2014/main" id="{81EA80E7-04AE-4FF3-96FF-9D6FBD376EF3}"/>
+              </a:ext>
+            </a:extLst>
+          </p:cNvPr>
+          <p:cNvSpPr txBox="1"/>
+          <p:nvPr/>
+        </p:nvSpPr>
+        <p:spPr>
+          <a:xfrm>
+            <a:off x="8445886" y="5475749"/>
+            <a:ext cx="2854157" cy="215444"/>
+          </a:xfrm>
+          <a:prstGeom prst="rect">
+            <a:avLst/>
+          </a:prstGeom>
+          <a:noFill/>
+        </p:spPr>
+        <p:txBody>
+          <a:bodyPr wrap="square" lIns="0" tIns="0" rIns="0" bIns="0" rtlCol="0">
+            <a:spAutoFit/>
+          </a:bodyPr>
+          <a:lstStyle>
+            <a:defPPr>
+              <a:defRPr lang="en-US"/>
+            </a:defPPr>
+            <a:lvl1pPr algn="r">
+              <a:defRPr sz="1400">
+                <a:solidFill>
+                  <a:srgbClr val="0070C0"/>
+                </a:solidFill>
+              </a:defRPr>
+            </a:lvl1pPr>
+          </a:lstStyle>
+          <a:p>
+            <a:r>
+              <a:rPr lang="en-US" dirty="0" err="1"/>
+              <a:t>Map.getDirectionRequest</a:t>
+            </a:r>
+            <a:r>
+              <a:rPr lang="en-US" dirty="0"/>
+              <a:t>()</a:t>
+            </a:r>
+          </a:p>
+        </p:txBody>
+      </p:sp>
+      <p:sp>
+        <p:nvSpPr>
+          <p:cNvPr id="124" name="TextBox 123">
+            <a:extLst>
+              <a:ext uri="{FF2B5EF4-FFF2-40B4-BE49-F238E27FC236}">
+                <a16:creationId xmlns:a16="http://schemas.microsoft.com/office/drawing/2014/main" id="{37DD3629-E7FD-4FAF-8101-11B9417CC026}"/>
+              </a:ext>
+            </a:extLst>
+          </p:cNvPr>
+          <p:cNvSpPr txBox="1"/>
+          <p:nvPr/>
+        </p:nvSpPr>
+        <p:spPr>
+          <a:xfrm>
+            <a:off x="8184574" y="5797008"/>
+            <a:ext cx="2854157" cy="215444"/>
+          </a:xfrm>
+          <a:prstGeom prst="rect">
+            <a:avLst/>
+          </a:prstGeom>
+          <a:noFill/>
+        </p:spPr>
+        <p:txBody>
+          <a:bodyPr wrap="square" lIns="0" tIns="0" rIns="0" bIns="0" rtlCol="0">
+            <a:spAutoFit/>
+          </a:bodyPr>
+          <a:lstStyle>
+            <a:defPPr>
+              <a:defRPr lang="en-US"/>
+            </a:defPPr>
+            <a:lvl1pPr algn="r">
+              <a:defRPr sz="1400">
+                <a:solidFill>
+                  <a:srgbClr val="0070C0"/>
+                </a:solidFill>
+              </a:defRPr>
+            </a:lvl1pPr>
+          </a:lstStyle>
+          <a:p>
+            <a:r>
+              <a:rPr lang="en-US" dirty="0" err="1"/>
+              <a:t>directionRequest</a:t>
+            </a:r>
+            <a:endParaRPr lang="en-US" dirty="0"/>
           </a:p>
         </p:txBody>
       </p:sp>

</xml_diff>